<commit_message>
Lecture 1 is updated.
Signed-off-by: Andrei Tatarnikov <andrewt0301@gmail.com>
</commit_message>
<xml_diff>
--- a/docs/part1ca/01_Introduction/CA_Lecture_01.pptx
+++ b/docs/part1ca/01_Introduction/CA_Lecture_01.pptx
@@ -136,7 +136,7 @@
   </p:defaultTextStyle>
   <p:extLst>
     <p:ext uri="{EFAFB233-063F-42B5-8137-9DF3F51BA10A}">
-      <p15:sldGuideLst xmlns:p15="http://schemas.microsoft.com/office/powerpoint/2012/main">
+      <p15:sldGuideLst xmlns:p15="http://schemas.microsoft.com/office/powerpoint/2012/main" xmlns="">
         <p15:guide id="1" orient="horz" pos="2160">
           <p15:clr>
             <a:srgbClr val="A4A3A4"/>
@@ -150,7 +150,7 @@
       </p15:sldGuideLst>
     </p:ext>
     <p:ext uri="{2D200454-40CA-4A62-9FC3-DE9A4176ACB9}">
-      <p15:notesGuideLst xmlns:p15="http://schemas.microsoft.com/office/powerpoint/2012/main">
+      <p15:notesGuideLst xmlns:p15="http://schemas.microsoft.com/office/powerpoint/2012/main" xmlns="">
         <p15:guide id="1" orient="horz" pos="2880">
           <p15:clr>
             <a:srgbClr val="A4A3A4"/>
@@ -258,7 +258,7 @@
             <a:fld id="{D0106195-8D78-4F6F-B8E4-FA67975ACEF5}" type="datetimeFigureOut">
               <a:rPr lang="ru-RU" smtClean="0"/>
               <a:pPr/>
-              <a:t>25.10.2020</a:t>
+              <a:t>16.11.2020</a:t>
             </a:fld>
             <a:endParaRPr lang="ru-RU"/>
           </a:p>
@@ -334,7 +334,7 @@
     </p:spTree>
     <p:extLst>
       <p:ext uri="{BB962C8B-B14F-4D97-AF65-F5344CB8AC3E}">
-        <p14:creationId xmlns:p14="http://schemas.microsoft.com/office/powerpoint/2010/main" val="827279973"/>
+        <p14:creationId xmlns:p14="http://schemas.microsoft.com/office/powerpoint/2010/main" xmlns="" val="827279973"/>
       </p:ext>
     </p:extLst>
   </p:cSld>
@@ -426,7 +426,7 @@
             <a:fld id="{878212F1-C3D9-4F2B-8F42-5E960FE8BE51}" type="datetimeFigureOut">
               <a:rPr lang="ru-RU" smtClean="0"/>
               <a:pPr/>
-              <a:t>25.10.2020</a:t>
+              <a:t>16.11.2020</a:t>
             </a:fld>
             <a:endParaRPr lang="ru-RU"/>
           </a:p>
@@ -595,7 +595,7 @@
     </p:spTree>
     <p:extLst>
       <p:ext uri="{BB962C8B-B14F-4D97-AF65-F5344CB8AC3E}">
-        <p14:creationId xmlns:p14="http://schemas.microsoft.com/office/powerpoint/2010/main" val="3865021395"/>
+        <p14:creationId xmlns:p14="http://schemas.microsoft.com/office/powerpoint/2010/main" xmlns="" val="3865021395"/>
       </p:ext>
     </p:extLst>
   </p:cSld>
@@ -809,7 +809,7 @@
     </p:spTree>
     <p:extLst>
       <p:ext uri="{BB962C8B-B14F-4D97-AF65-F5344CB8AC3E}">
-        <p14:creationId xmlns:p14="http://schemas.microsoft.com/office/powerpoint/2010/main" val="2381791527"/>
+        <p14:creationId xmlns:p14="http://schemas.microsoft.com/office/powerpoint/2010/main" xmlns="" val="2381791527"/>
       </p:ext>
     </p:extLst>
   </p:cSld>
@@ -932,7 +932,7 @@
     </p:spTree>
     <p:extLst>
       <p:ext uri="{BB962C8B-B14F-4D97-AF65-F5344CB8AC3E}">
-        <p14:creationId xmlns:p14="http://schemas.microsoft.com/office/powerpoint/2010/main" val="1915950851"/>
+        <p14:creationId xmlns:p14="http://schemas.microsoft.com/office/powerpoint/2010/main" xmlns="" val="1915950851"/>
       </p:ext>
     </p:extLst>
   </p:cSld>
@@ -1192,7 +1192,7 @@
     </p:spTree>
     <p:extLst>
       <p:ext uri="{BB962C8B-B14F-4D97-AF65-F5344CB8AC3E}">
-        <p14:creationId xmlns:p14="http://schemas.microsoft.com/office/powerpoint/2010/main" val="322455162"/>
+        <p14:creationId xmlns:p14="http://schemas.microsoft.com/office/powerpoint/2010/main" xmlns="" val="322455162"/>
       </p:ext>
     </p:extLst>
   </p:cSld>
@@ -1366,7 +1366,7 @@
     </p:spTree>
     <p:extLst>
       <p:ext uri="{BB962C8B-B14F-4D97-AF65-F5344CB8AC3E}">
-        <p14:creationId xmlns:p14="http://schemas.microsoft.com/office/powerpoint/2010/main" val="971117636"/>
+        <p14:creationId xmlns:p14="http://schemas.microsoft.com/office/powerpoint/2010/main" xmlns="" val="971117636"/>
       </p:ext>
     </p:extLst>
   </p:cSld>
@@ -1543,7 +1543,7 @@
     </p:spTree>
     <p:extLst>
       <p:ext uri="{BB962C8B-B14F-4D97-AF65-F5344CB8AC3E}">
-        <p14:creationId xmlns:p14="http://schemas.microsoft.com/office/powerpoint/2010/main" val="3348877825"/>
+        <p14:creationId xmlns:p14="http://schemas.microsoft.com/office/powerpoint/2010/main" xmlns="" val="3348877825"/>
       </p:ext>
     </p:extLst>
   </p:cSld>
@@ -1868,7 +1868,7 @@
     </p:spTree>
     <p:extLst>
       <p:ext uri="{BB962C8B-B14F-4D97-AF65-F5344CB8AC3E}">
-        <p14:creationId xmlns:p14="http://schemas.microsoft.com/office/powerpoint/2010/main" val="3256953994"/>
+        <p14:creationId xmlns:p14="http://schemas.microsoft.com/office/powerpoint/2010/main" xmlns="" val="3256953994"/>
       </p:ext>
     </p:extLst>
   </p:cSld>
@@ -2118,7 +2118,7 @@
     </p:spTree>
     <p:extLst>
       <p:ext uri="{BB962C8B-B14F-4D97-AF65-F5344CB8AC3E}">
-        <p14:creationId xmlns:p14="http://schemas.microsoft.com/office/powerpoint/2010/main" val="3067076846"/>
+        <p14:creationId xmlns:p14="http://schemas.microsoft.com/office/powerpoint/2010/main" xmlns="" val="3067076846"/>
       </p:ext>
     </p:extLst>
   </p:cSld>
@@ -2354,7 +2354,7 @@
     </p:spTree>
     <p:extLst>
       <p:ext uri="{BB962C8B-B14F-4D97-AF65-F5344CB8AC3E}">
-        <p14:creationId xmlns:p14="http://schemas.microsoft.com/office/powerpoint/2010/main" val="3710015975"/>
+        <p14:creationId xmlns:p14="http://schemas.microsoft.com/office/powerpoint/2010/main" xmlns="" val="3710015975"/>
       </p:ext>
     </p:extLst>
   </p:cSld>
@@ -2725,7 +2725,7 @@
     </p:spTree>
     <p:extLst>
       <p:ext uri="{BB962C8B-B14F-4D97-AF65-F5344CB8AC3E}">
-        <p14:creationId xmlns:p14="http://schemas.microsoft.com/office/powerpoint/2010/main" val="4075590966"/>
+        <p14:creationId xmlns:p14="http://schemas.microsoft.com/office/powerpoint/2010/main" xmlns="" val="4075590966"/>
       </p:ext>
     </p:extLst>
   </p:cSld>
@@ -2847,7 +2847,7 @@
     </p:spTree>
     <p:extLst>
       <p:ext uri="{BB962C8B-B14F-4D97-AF65-F5344CB8AC3E}">
-        <p14:creationId xmlns:p14="http://schemas.microsoft.com/office/powerpoint/2010/main" val="2889604898"/>
+        <p14:creationId xmlns:p14="http://schemas.microsoft.com/office/powerpoint/2010/main" xmlns="" val="2889604898"/>
       </p:ext>
     </p:extLst>
   </p:cSld>
@@ -2946,7 +2946,7 @@
     </p:spTree>
     <p:extLst>
       <p:ext uri="{BB962C8B-B14F-4D97-AF65-F5344CB8AC3E}">
-        <p14:creationId xmlns:p14="http://schemas.microsoft.com/office/powerpoint/2010/main" val="152384765"/>
+        <p14:creationId xmlns:p14="http://schemas.microsoft.com/office/powerpoint/2010/main" xmlns="" val="152384765"/>
       </p:ext>
     </p:extLst>
   </p:cSld>
@@ -3227,7 +3227,7 @@
     </p:spTree>
     <p:extLst>
       <p:ext uri="{BB962C8B-B14F-4D97-AF65-F5344CB8AC3E}">
-        <p14:creationId xmlns:p14="http://schemas.microsoft.com/office/powerpoint/2010/main" val="2127791886"/>
+        <p14:creationId xmlns:p14="http://schemas.microsoft.com/office/powerpoint/2010/main" xmlns="" val="2127791886"/>
       </p:ext>
     </p:extLst>
   </p:cSld>
@@ -3484,7 +3484,7 @@
     </p:spTree>
     <p:extLst>
       <p:ext uri="{BB962C8B-B14F-4D97-AF65-F5344CB8AC3E}">
-        <p14:creationId xmlns:p14="http://schemas.microsoft.com/office/powerpoint/2010/main" val="1752705130"/>
+        <p14:creationId xmlns:p14="http://schemas.microsoft.com/office/powerpoint/2010/main" xmlns="" val="1752705130"/>
       </p:ext>
     </p:extLst>
   </p:cSld>
@@ -3737,7 +3737,7 @@
     </p:spTree>
     <p:extLst>
       <p:ext uri="{BB962C8B-B14F-4D97-AF65-F5344CB8AC3E}">
-        <p14:creationId xmlns:p14="http://schemas.microsoft.com/office/powerpoint/2010/main" val="968833914"/>
+        <p14:creationId xmlns:p14="http://schemas.microsoft.com/office/powerpoint/2010/main" xmlns="" val="968833914"/>
       </p:ext>
     </p:extLst>
   </p:cSld>
@@ -4214,7 +4214,7 @@
     </p:spTree>
     <p:extLst>
       <p:ext uri="{BB962C8B-B14F-4D97-AF65-F5344CB8AC3E}">
-        <p14:creationId xmlns:p14="http://schemas.microsoft.com/office/powerpoint/2010/main" val="2492894732"/>
+        <p14:creationId xmlns:p14="http://schemas.microsoft.com/office/powerpoint/2010/main" xmlns="" val="2492894732"/>
       </p:ext>
     </p:extLst>
   </p:cSld>
@@ -4258,7 +4258,7 @@
             <p:ph idx="1"/>
             <p:extLst>
               <p:ext uri="{D42A27DB-BD31-4B8C-83A1-F6EECF244321}">
-                <p14:modId xmlns:p14="http://schemas.microsoft.com/office/powerpoint/2010/main" val="2853019934"/>
+                <p14:modId xmlns:p14="http://schemas.microsoft.com/office/powerpoint/2010/main" xmlns="" val="2853019934"/>
               </p:ext>
             </p:extLst>
           </p:nvPr>
@@ -4691,8 +4691,8 @@
           </a:p>
         </p:txBody>
       </p:sp>
-      <mc:AlternateContent xmlns:mc="http://schemas.openxmlformats.org/markup-compatibility/2006" xmlns:a14="http://schemas.microsoft.com/office/drawing/2010/main">
-        <mc:Choice Requires="a14">
+      <mc:AlternateContent xmlns:mc="http://schemas.openxmlformats.org/markup-compatibility/2006">
+        <mc:Choice xmlns:a14="http://schemas.microsoft.com/office/drawing/2010/main" xmlns="" Requires="a14">
           <p:sp>
             <p:nvSpPr>
               <p:cNvPr id="6" name="Rectangle 5"/>
@@ -4841,7 +4841,7 @@
             </p:txBody>
           </p:sp>
         </mc:Choice>
-        <mc:Fallback xmlns="">
+        <mc:Fallback>
           <p:sp>
             <p:nvSpPr>
               <p:cNvPr id="6" name="Rectangle 5"/>
@@ -4859,7 +4859,7 @@
                 <a:avLst/>
               </a:prstGeom>
               <a:blipFill rotWithShape="0">
-                <a:blip r:embed="rId2"/>
+                <a:blip r:embed="rId2" cstate="print"/>
                 <a:stretch>
                   <a:fillRect l="-1185" t="-4808" r="-1185" b="-30769"/>
                 </a:stretch>
@@ -4883,7 +4883,7 @@
     </p:spTree>
     <p:extLst>
       <p:ext uri="{BB962C8B-B14F-4D97-AF65-F5344CB8AC3E}">
-        <p14:creationId xmlns:p14="http://schemas.microsoft.com/office/powerpoint/2010/main" val="1319878854"/>
+        <p14:creationId xmlns:p14="http://schemas.microsoft.com/office/powerpoint/2010/main" xmlns="" val="1319878854"/>
       </p:ext>
     </p:extLst>
   </p:cSld>
@@ -4975,7 +4975,7 @@
             <p:ph idx="1"/>
             <p:extLst>
               <p:ext uri="{D42A27DB-BD31-4B8C-83A1-F6EECF244321}">
-                <p14:modId xmlns:p14="http://schemas.microsoft.com/office/powerpoint/2010/main" val="895195415"/>
+                <p14:modId xmlns:p14="http://schemas.microsoft.com/office/powerpoint/2010/main" xmlns="" val="895195415"/>
               </p:ext>
             </p:extLst>
           </p:nvPr>
@@ -5279,7 +5279,7 @@
     </p:spTree>
     <p:extLst>
       <p:ext uri="{BB962C8B-B14F-4D97-AF65-F5344CB8AC3E}">
-        <p14:creationId xmlns:p14="http://schemas.microsoft.com/office/powerpoint/2010/main" val="1991606056"/>
+        <p14:creationId xmlns:p14="http://schemas.microsoft.com/office/powerpoint/2010/main" xmlns="" val="1991606056"/>
       </p:ext>
     </p:extLst>
   </p:cSld>
@@ -5444,10 +5444,10 @@
           <p:nvPr/>
         </p:nvPicPr>
         <p:blipFill>
-          <a:blip r:embed="rId2">
+          <a:blip r:embed="rId2" cstate="print">
             <a:extLst>
               <a:ext uri="{28A0092B-C50C-407E-A947-70E740481C1C}">
-                <a14:useLocalDpi xmlns:a14="http://schemas.microsoft.com/office/drawing/2010/main" val="0"/>
+                <a14:useLocalDpi xmlns:a14="http://schemas.microsoft.com/office/drawing/2010/main" xmlns="" val="0"/>
               </a:ext>
             </a:extLst>
           </a:blip>
@@ -5467,7 +5467,7 @@
           <a:noFill/>
           <a:extLst>
             <a:ext uri="{909E8E84-426E-40DD-AFC4-6F175D3DCCD1}">
-              <a14:hiddenFill xmlns:a14="http://schemas.microsoft.com/office/drawing/2010/main">
+              <a14:hiddenFill xmlns:a14="http://schemas.microsoft.com/office/drawing/2010/main" xmlns="">
                 <a:solidFill>
                   <a:srgbClr val="FFFFFF"/>
                 </a:solidFill>
@@ -5479,7 +5479,7 @@
     </p:spTree>
     <p:extLst>
       <p:ext uri="{BB962C8B-B14F-4D97-AF65-F5344CB8AC3E}">
-        <p14:creationId xmlns:p14="http://schemas.microsoft.com/office/powerpoint/2010/main" val="1147934676"/>
+        <p14:creationId xmlns:p14="http://schemas.microsoft.com/office/powerpoint/2010/main" xmlns="" val="1147934676"/>
       </p:ext>
     </p:extLst>
   </p:cSld>
@@ -6374,10 +6374,10 @@
           <p:nvPr/>
         </p:nvPicPr>
         <p:blipFill>
-          <a:blip r:embed="rId2">
+          <a:blip r:embed="rId2" cstate="print">
             <a:extLst>
               <a:ext uri="{28A0092B-C50C-407E-A947-70E740481C1C}">
-                <a14:useLocalDpi xmlns:a14="http://schemas.microsoft.com/office/drawing/2010/main" val="0"/>
+                <a14:useLocalDpi xmlns:a14="http://schemas.microsoft.com/office/drawing/2010/main" xmlns="" val="0"/>
               </a:ext>
             </a:extLst>
           </a:blip>
@@ -6397,7 +6397,7 @@
           <a:noFill/>
           <a:extLst>
             <a:ext uri="{909E8E84-426E-40DD-AFC4-6F175D3DCCD1}">
-              <a14:hiddenFill xmlns:a14="http://schemas.microsoft.com/office/drawing/2010/main">
+              <a14:hiddenFill xmlns:a14="http://schemas.microsoft.com/office/drawing/2010/main" xmlns="">
                 <a:solidFill>
                   <a:srgbClr val="FFFFFF"/>
                 </a:solidFill>
@@ -6409,7 +6409,7 @@
     </p:spTree>
     <p:extLst>
       <p:ext uri="{BB962C8B-B14F-4D97-AF65-F5344CB8AC3E}">
-        <p14:creationId xmlns:p14="http://schemas.microsoft.com/office/powerpoint/2010/main" val="2950914556"/>
+        <p14:creationId xmlns:p14="http://schemas.microsoft.com/office/powerpoint/2010/main" xmlns="" val="2950914556"/>
       </p:ext>
     </p:extLst>
   </p:cSld>
@@ -6452,10 +6452,10 @@
           <p:nvPr/>
         </p:nvPicPr>
         <p:blipFill>
-          <a:blip r:embed="rId2">
+          <a:blip r:embed="rId2" cstate="print">
             <a:extLst>
               <a:ext uri="{28A0092B-C50C-407E-A947-70E740481C1C}">
-                <a14:useLocalDpi xmlns:a14="http://schemas.microsoft.com/office/drawing/2010/main" val="0"/>
+                <a14:useLocalDpi xmlns:a14="http://schemas.microsoft.com/office/drawing/2010/main" xmlns="" val="0"/>
               </a:ext>
             </a:extLst>
           </a:blip>
@@ -6475,7 +6475,7 @@
           <a:noFill/>
           <a:extLst>
             <a:ext uri="{909E8E84-426E-40DD-AFC4-6F175D3DCCD1}">
-              <a14:hiddenFill xmlns:a14="http://schemas.microsoft.com/office/drawing/2010/main">
+              <a14:hiddenFill xmlns:a14="http://schemas.microsoft.com/office/drawing/2010/main" xmlns="">
                 <a:solidFill>
                   <a:srgbClr val="FFFFFF"/>
                 </a:solidFill>
@@ -7048,7 +7048,7 @@
     </p:spTree>
     <p:extLst>
       <p:ext uri="{BB962C8B-B14F-4D97-AF65-F5344CB8AC3E}">
-        <p14:creationId xmlns:p14="http://schemas.microsoft.com/office/powerpoint/2010/main" val="4087179089"/>
+        <p14:creationId xmlns:p14="http://schemas.microsoft.com/office/powerpoint/2010/main" xmlns="" val="4087179089"/>
       </p:ext>
     </p:extLst>
   </p:cSld>
@@ -7254,7 +7254,7 @@
           <a:blip r:embed="rId2" cstate="print">
             <a:extLst>
               <a:ext uri="{28A0092B-C50C-407E-A947-70E740481C1C}">
-                <a14:useLocalDpi xmlns:a14="http://schemas.microsoft.com/office/drawing/2010/main" val="0"/>
+                <a14:useLocalDpi xmlns:a14="http://schemas.microsoft.com/office/drawing/2010/main" xmlns="" val="0"/>
               </a:ext>
             </a:extLst>
           </a:blip>
@@ -7274,7 +7274,7 @@
           <a:noFill/>
           <a:extLst>
             <a:ext uri="{909E8E84-426E-40DD-AFC4-6F175D3DCCD1}">
-              <a14:hiddenFill xmlns:a14="http://schemas.microsoft.com/office/drawing/2010/main">
+              <a14:hiddenFill xmlns:a14="http://schemas.microsoft.com/office/drawing/2010/main" xmlns="">
                 <a:solidFill>
                   <a:srgbClr val="FFFFFF"/>
                 </a:solidFill>
@@ -7292,10 +7292,10 @@
           <p:nvPr/>
         </p:nvPicPr>
         <p:blipFill>
-          <a:blip r:embed="rId3">
+          <a:blip r:embed="rId3" cstate="print">
             <a:extLst>
               <a:ext uri="{28A0092B-C50C-407E-A947-70E740481C1C}">
-                <a14:useLocalDpi xmlns:a14="http://schemas.microsoft.com/office/drawing/2010/main" val="0"/>
+                <a14:useLocalDpi xmlns:a14="http://schemas.microsoft.com/office/drawing/2010/main" xmlns="" val="0"/>
               </a:ext>
             </a:extLst>
           </a:blip>
@@ -7315,7 +7315,7 @@
           <a:noFill/>
           <a:extLst>
             <a:ext uri="{909E8E84-426E-40DD-AFC4-6F175D3DCCD1}">
-              <a14:hiddenFill xmlns:a14="http://schemas.microsoft.com/office/drawing/2010/main">
+              <a14:hiddenFill xmlns:a14="http://schemas.microsoft.com/office/drawing/2010/main" xmlns="">
                 <a:solidFill>
                   <a:srgbClr val="FFFFFF"/>
                 </a:solidFill>
@@ -7327,7 +7327,7 @@
     </p:spTree>
     <p:extLst>
       <p:ext uri="{BB962C8B-B14F-4D97-AF65-F5344CB8AC3E}">
-        <p14:creationId xmlns:p14="http://schemas.microsoft.com/office/powerpoint/2010/main" val="4020093932"/>
+        <p14:creationId xmlns:p14="http://schemas.microsoft.com/office/powerpoint/2010/main" xmlns="" val="4020093932"/>
       </p:ext>
     </p:extLst>
   </p:cSld>
@@ -7540,7 +7540,7 @@
           <a:blip r:embed="rId2" cstate="print">
             <a:extLst>
               <a:ext uri="{28A0092B-C50C-407E-A947-70E740481C1C}">
-                <a14:useLocalDpi xmlns:a14="http://schemas.microsoft.com/office/drawing/2010/main" val="0"/>
+                <a14:useLocalDpi xmlns:a14="http://schemas.microsoft.com/office/drawing/2010/main" xmlns="" val="0"/>
               </a:ext>
             </a:extLst>
           </a:blip>
@@ -7563,14 +7563,14 @@
           </a:ln>
           <a:extLst>
             <a:ext uri="{909E8E84-426E-40DD-AFC4-6F175D3DCCD1}">
-              <a14:hiddenFill xmlns:a14="http://schemas.microsoft.com/office/drawing/2010/main">
+              <a14:hiddenFill xmlns:a14="http://schemas.microsoft.com/office/drawing/2010/main" xmlns="">
                 <a:solidFill>
                   <a:srgbClr val="FFFFFF"/>
                 </a:solidFill>
               </a14:hiddenFill>
             </a:ext>
             <a:ext uri="{91240B29-F687-4F45-9708-019B960494DF}">
-              <a14:hiddenLine xmlns:a14="http://schemas.microsoft.com/office/drawing/2010/main" w="9525">
+              <a14:hiddenLine xmlns:a14="http://schemas.microsoft.com/office/drawing/2010/main" xmlns="" w="9525">
                 <a:solidFill>
                   <a:srgbClr val="000000"/>
                 </a:solidFill>
@@ -7585,7 +7585,7 @@
     </p:spTree>
     <p:extLst>
       <p:ext uri="{BB962C8B-B14F-4D97-AF65-F5344CB8AC3E}">
-        <p14:creationId xmlns:p14="http://schemas.microsoft.com/office/powerpoint/2010/main" val="3856844071"/>
+        <p14:creationId xmlns:p14="http://schemas.microsoft.com/office/powerpoint/2010/main" xmlns="" val="3856844071"/>
       </p:ext>
     </p:extLst>
   </p:cSld>
@@ -7628,10 +7628,10 @@
           <p:nvPr/>
         </p:nvPicPr>
         <p:blipFill>
-          <a:blip r:embed="rId2">
+          <a:blip r:embed="rId2" cstate="print">
             <a:extLst>
               <a:ext uri="{28A0092B-C50C-407E-A947-70E740481C1C}">
-                <a14:useLocalDpi xmlns:a14="http://schemas.microsoft.com/office/drawing/2010/main" val="0"/>
+                <a14:useLocalDpi xmlns:a14="http://schemas.microsoft.com/office/drawing/2010/main" xmlns="" val="0"/>
               </a:ext>
             </a:extLst>
           </a:blip>
@@ -7654,14 +7654,14 @@
           </a:ln>
           <a:extLst>
             <a:ext uri="{909E8E84-426E-40DD-AFC4-6F175D3DCCD1}">
-              <a14:hiddenFill xmlns:a14="http://schemas.microsoft.com/office/drawing/2010/main">
+              <a14:hiddenFill xmlns:a14="http://schemas.microsoft.com/office/drawing/2010/main" xmlns="">
                 <a:solidFill>
                   <a:srgbClr val="FFFFFF"/>
                 </a:solidFill>
               </a14:hiddenFill>
             </a:ext>
             <a:ext uri="{91240B29-F687-4F45-9708-019B960494DF}">
-              <a14:hiddenLine xmlns:a14="http://schemas.microsoft.com/office/drawing/2010/main" w="9525">
+              <a14:hiddenLine xmlns:a14="http://schemas.microsoft.com/office/drawing/2010/main" xmlns="" w="9525">
                 <a:solidFill>
                   <a:srgbClr val="000000"/>
                 </a:solidFill>
@@ -8167,7 +8167,7 @@
           <p:nvPr>
             <p:extLst>
               <p:ext uri="{D42A27DB-BD31-4B8C-83A1-F6EECF244321}">
-                <p14:modId xmlns:p14="http://schemas.microsoft.com/office/powerpoint/2010/main" val="1213753623"/>
+                <p14:modId xmlns:p14="http://schemas.microsoft.com/office/powerpoint/2010/main" xmlns="" val="1213753623"/>
               </p:ext>
             </p:extLst>
           </p:nvPr>
@@ -9880,7 +9880,7 @@
     </p:spTree>
     <p:extLst>
       <p:ext uri="{BB962C8B-B14F-4D97-AF65-F5344CB8AC3E}">
-        <p14:creationId xmlns:p14="http://schemas.microsoft.com/office/powerpoint/2010/main" val="1153504515"/>
+        <p14:creationId xmlns:p14="http://schemas.microsoft.com/office/powerpoint/2010/main" xmlns="" val="1153504515"/>
       </p:ext>
     </p:extLst>
   </p:cSld>
@@ -10050,7 +10050,7 @@
     </p:spTree>
     <p:extLst>
       <p:ext uri="{BB962C8B-B14F-4D97-AF65-F5344CB8AC3E}">
-        <p14:creationId xmlns:p14="http://schemas.microsoft.com/office/powerpoint/2010/main" val="664014649"/>
+        <p14:creationId xmlns:p14="http://schemas.microsoft.com/office/powerpoint/2010/main" xmlns="" val="664014649"/>
       </p:ext>
     </p:extLst>
   </p:cSld>
@@ -10147,8 +10147,13 @@
           <a:p>
             <a:r>
               <a:rPr lang="en-US" sz="3500" b="1" dirty="0" smtClean="0"/>
-              <a:t>Telegram channel</a:t>
-            </a:r>
+              <a:t>Telegram </a:t>
+            </a:r>
+            <a:r>
+              <a:rPr lang="en-US" sz="3500" b="1" dirty="0" smtClean="0"/>
+              <a:t>group</a:t>
+            </a:r>
+            <a:endParaRPr lang="en-US" sz="3500" b="1" dirty="0" smtClean="0"/>
           </a:p>
           <a:p>
             <a:pPr>
@@ -10158,8 +10163,11 @@
               <a:rPr lang="en-US" sz="3200" dirty="0" smtClean="0">
                 <a:hlinkClick r:id="rId2"/>
               </a:rPr>
-              <a:t>https://t.me/joinchat/AAAAAFDXhCd-WvYYZwBPGQ</a:t>
-            </a:r>
+              <a:t>https://t.me/joinchat/KNIiWh0pCrpZ11XkuwnxnQ</a:t>
+            </a:r>
+            <a:endParaRPr lang="en-US" sz="3200" dirty="0" smtClean="0">
+              <a:hlinkClick r:id="rId2"/>
+            </a:endParaRPr>
           </a:p>
           <a:p>
             <a:pPr>
@@ -10330,7 +10338,7 @@
           <p:nvPr/>
         </p:nvPicPr>
         <p:blipFill>
-          <a:blip r:embed="rId2"/>
+          <a:blip r:embed="rId2" cstate="print"/>
           <a:stretch>
             <a:fillRect/>
           </a:stretch>
@@ -10644,7 +10652,7 @@
     </p:spTree>
     <p:extLst>
       <p:ext uri="{BB962C8B-B14F-4D97-AF65-F5344CB8AC3E}">
-        <p14:creationId xmlns:p14="http://schemas.microsoft.com/office/powerpoint/2010/main" val="1974197127"/>
+        <p14:creationId xmlns:p14="http://schemas.microsoft.com/office/powerpoint/2010/main" xmlns="" val="1974197127"/>
       </p:ext>
     </p:extLst>
   </p:cSld>
@@ -10735,10 +10743,10 @@
           <p:nvPr/>
         </p:nvPicPr>
         <p:blipFill>
-          <a:blip r:embed="rId2">
+          <a:blip r:embed="rId2" cstate="print">
             <a:extLst>
               <a:ext uri="{28A0092B-C50C-407E-A947-70E740481C1C}">
-                <a14:useLocalDpi xmlns:a14="http://schemas.microsoft.com/office/drawing/2010/main" val="0"/>
+                <a14:useLocalDpi xmlns:a14="http://schemas.microsoft.com/office/drawing/2010/main" xmlns="" val="0"/>
               </a:ext>
             </a:extLst>
           </a:blip>
@@ -10761,14 +10769,14 @@
           </a:ln>
           <a:extLst>
             <a:ext uri="{909E8E84-426E-40DD-AFC4-6F175D3DCCD1}">
-              <a14:hiddenFill xmlns:a14="http://schemas.microsoft.com/office/drawing/2010/main">
+              <a14:hiddenFill xmlns:a14="http://schemas.microsoft.com/office/drawing/2010/main" xmlns="">
                 <a:solidFill>
                   <a:srgbClr val="FFFFFF"/>
                 </a:solidFill>
               </a14:hiddenFill>
             </a:ext>
             <a:ext uri="{91240B29-F687-4F45-9708-019B960494DF}">
-              <a14:hiddenLine xmlns:a14="http://schemas.microsoft.com/office/drawing/2010/main" w="9525">
+              <a14:hiddenLine xmlns:a14="http://schemas.microsoft.com/office/drawing/2010/main" xmlns="" w="9525">
                 <a:solidFill>
                   <a:srgbClr val="000000"/>
                 </a:solidFill>
@@ -10783,7 +10791,7 @@
     </p:spTree>
     <p:extLst>
       <p:ext uri="{BB962C8B-B14F-4D97-AF65-F5344CB8AC3E}">
-        <p14:creationId xmlns:p14="http://schemas.microsoft.com/office/powerpoint/2010/main" val="2270459329"/>
+        <p14:creationId xmlns:p14="http://schemas.microsoft.com/office/powerpoint/2010/main" xmlns="" val="2270459329"/>
       </p:ext>
     </p:extLst>
   </p:cSld>
@@ -10874,7 +10882,7 @@
           <p:nvPr/>
         </p:nvPicPr>
         <p:blipFill>
-          <a:blip r:embed="rId2"/>
+          <a:blip r:embed="rId2" cstate="print"/>
           <a:stretch>
             <a:fillRect/>
           </a:stretch>
@@ -10892,7 +10900,7 @@
     </p:spTree>
     <p:extLst>
       <p:ext uri="{BB962C8B-B14F-4D97-AF65-F5344CB8AC3E}">
-        <p14:creationId xmlns:p14="http://schemas.microsoft.com/office/powerpoint/2010/main" val="4095291685"/>
+        <p14:creationId xmlns:p14="http://schemas.microsoft.com/office/powerpoint/2010/main" xmlns="" val="4095291685"/>
       </p:ext>
     </p:extLst>
   </p:cSld>
@@ -11155,7 +11163,7 @@
     </p:spTree>
     <p:extLst>
       <p:ext uri="{BB962C8B-B14F-4D97-AF65-F5344CB8AC3E}">
-        <p14:creationId xmlns:p14="http://schemas.microsoft.com/office/powerpoint/2010/main" val="1324819286"/>
+        <p14:creationId xmlns:p14="http://schemas.microsoft.com/office/powerpoint/2010/main" xmlns="" val="1324819286"/>
       </p:ext>
     </p:extLst>
   </p:cSld>
@@ -11348,14 +11356,14 @@
           <a:effectLst/>
           <a:extLst>
             <a:ext uri="{909E8E84-426E-40DD-AFC4-6F175D3DCCD1}">
-              <a14:hiddenFill xmlns:a14="http://schemas.microsoft.com/office/drawing/2010/main">
+              <a14:hiddenFill xmlns:a14="http://schemas.microsoft.com/office/drawing/2010/main" xmlns="">
                 <a:solidFill>
                   <a:schemeClr val="accent1"/>
                 </a:solidFill>
               </a14:hiddenFill>
             </a:ext>
             <a:ext uri="{91240B29-F687-4F45-9708-019B960494DF}">
-              <a14:hiddenLine xmlns:a14="http://schemas.microsoft.com/office/drawing/2010/main" w="9525">
+              <a14:hiddenLine xmlns:a14="http://schemas.microsoft.com/office/drawing/2010/main" xmlns="" w="9525">
                 <a:solidFill>
                   <a:schemeClr val="tx1"/>
                 </a:solidFill>
@@ -11365,7 +11373,7 @@
               </a14:hiddenLine>
             </a:ext>
             <a:ext uri="{AF507438-7753-43E0-B8FC-AC1667EBCBE1}">
-              <a14:hiddenEffects xmlns:a14="http://schemas.microsoft.com/office/drawing/2010/main">
+              <a14:hiddenEffects xmlns:a14="http://schemas.microsoft.com/office/drawing/2010/main" xmlns="">
                 <a:effectLst>
                   <a:outerShdw dist="35921" dir="2700000" algn="ctr" rotWithShape="0">
                     <a:schemeClr val="bg2"/>
@@ -11473,7 +11481,7 @@
     </p:spTree>
     <p:extLst>
       <p:ext uri="{BB962C8B-B14F-4D97-AF65-F5344CB8AC3E}">
-        <p14:creationId xmlns:p14="http://schemas.microsoft.com/office/powerpoint/2010/main" val="3293126798"/>
+        <p14:creationId xmlns:p14="http://schemas.microsoft.com/office/powerpoint/2010/main" xmlns="" val="3293126798"/>
       </p:ext>
     </p:extLst>
   </p:cSld>
@@ -12054,7 +12062,7 @@
     </p:spTree>
     <p:extLst>
       <p:ext uri="{BB962C8B-B14F-4D97-AF65-F5344CB8AC3E}">
-        <p14:creationId xmlns:p14="http://schemas.microsoft.com/office/powerpoint/2010/main" val="4217875043"/>
+        <p14:creationId xmlns:p14="http://schemas.microsoft.com/office/powerpoint/2010/main" xmlns="" val="4217875043"/>
       </p:ext>
     </p:extLst>
   </p:cSld>
@@ -12141,7 +12149,7 @@
         </p:nvSpPr>
         <p:spPr>
           <a:xfrm>
-            <a:off x="873826" y="4229935"/>
+            <a:off x="873826" y="4306135"/>
             <a:ext cx="10515600" cy="2372746"/>
           </a:xfrm>
         </p:spPr>
@@ -12306,6 +12314,85 @@
               </a:rPr>
               <a:t>Instructors</a:t>
             </a:r>
+          </a:p>
+        </p:txBody>
+      </p:sp>
+      <p:pic>
+        <p:nvPicPr>
+          <p:cNvPr id="9" name="Рисунок 8" descr="photo_2020-11-16 20.23.40.jpeg"/>
+          <p:cNvPicPr>
+            <a:picLocks noChangeAspect="1"/>
+          </p:cNvPicPr>
+          <p:nvPr/>
+        </p:nvPicPr>
+        <p:blipFill>
+          <a:blip r:embed="rId3" cstate="print"/>
+          <a:stretch>
+            <a:fillRect/>
+          </a:stretch>
+        </p:blipFill>
+        <p:spPr>
+          <a:xfrm>
+            <a:off x="5003800" y="1562100"/>
+            <a:ext cx="2194560" cy="2194560"/>
+          </a:xfrm>
+          <a:prstGeom prst="rect">
+            <a:avLst/>
+          </a:prstGeom>
+        </p:spPr>
+      </p:pic>
+      <p:sp>
+        <p:nvSpPr>
+          <p:cNvPr id="10" name="TextBox 9"/>
+          <p:cNvSpPr txBox="1"/>
+          <p:nvPr/>
+        </p:nvSpPr>
+        <p:spPr>
+          <a:xfrm>
+            <a:off x="4866738" y="3682190"/>
+            <a:ext cx="2422568" cy="629392"/>
+          </a:xfrm>
+          <a:prstGeom prst="rect">
+            <a:avLst/>
+          </a:prstGeom>
+          <a:noFill/>
+        </p:spPr>
+        <p:txBody>
+          <a:bodyPr wrap="square" lIns="72000" tIns="25200" rIns="0" bIns="25200" rtlCol="0" anchor="ctr" anchorCtr="0">
+            <a:noAutofit/>
+          </a:bodyPr>
+          <a:lstStyle/>
+          <a:p>
+            <a:pPr algn="ctr"/>
+            <a:r>
+              <a:rPr lang="en-US" sz="2400" b="1" dirty="0" err="1" smtClean="0">
+                <a:solidFill>
+                  <a:srgbClr val="1E3272"/>
+                </a:solidFill>
+              </a:rPr>
+              <a:t>Alexey</a:t>
+            </a:r>
+            <a:r>
+              <a:rPr lang="en-US" sz="2400" b="1" dirty="0" smtClean="0">
+                <a:solidFill>
+                  <a:srgbClr val="1E3272"/>
+                </a:solidFill>
+              </a:rPr>
+              <a:t> </a:t>
+            </a:r>
+            <a:r>
+              <a:rPr lang="en-US" sz="2400" b="1" dirty="0" err="1" smtClean="0">
+                <a:solidFill>
+                  <a:srgbClr val="1E3272"/>
+                </a:solidFill>
+              </a:rPr>
+              <a:t>Kanakhin</a:t>
+            </a:r>
+            <a:endParaRPr lang="ru-RU" sz="2400" b="1" dirty="0" smtClean="0">
+              <a:solidFill>
+                <a:srgbClr val="1E3272"/>
+              </a:solidFill>
+            </a:endParaRPr>
           </a:p>
         </p:txBody>
       </p:sp>
@@ -12832,7 +12919,7 @@
           <a:effectLst/>
           <a:extLst>
             <a:ext uri="{91240B29-F687-4F45-9708-019B960494DF}">
-              <a14:hiddenLine xmlns:a14="http://schemas.microsoft.com/office/drawing/2010/main" w="9525">
+              <a14:hiddenLine xmlns:a14="http://schemas.microsoft.com/office/drawing/2010/main" xmlns="" w="9525">
                 <a:solidFill>
                   <a:schemeClr val="tx1"/>
                 </a:solidFill>
@@ -12842,7 +12929,7 @@
               </a14:hiddenLine>
             </a:ext>
             <a:ext uri="{AF507438-7753-43E0-B8FC-AC1667EBCBE1}">
-              <a14:hiddenEffects xmlns:a14="http://schemas.microsoft.com/office/drawing/2010/main">
+              <a14:hiddenEffects xmlns:a14="http://schemas.microsoft.com/office/drawing/2010/main" xmlns="">
                 <a:effectLst>
                   <a:outerShdw dist="35921" dir="2700000" algn="ctr" rotWithShape="0">
                     <a:schemeClr val="bg2"/>
@@ -14414,7 +14501,7 @@
           <a:effectLst/>
           <a:extLst>
             <a:ext uri="{91240B29-F687-4F45-9708-019B960494DF}">
-              <a14:hiddenLine xmlns:a14="http://schemas.microsoft.com/office/drawing/2010/main" w="9525">
+              <a14:hiddenLine xmlns:a14="http://schemas.microsoft.com/office/drawing/2010/main" xmlns="" w="9525">
                 <a:solidFill>
                   <a:schemeClr val="tx1"/>
                 </a:solidFill>
@@ -14424,7 +14511,7 @@
               </a14:hiddenLine>
             </a:ext>
             <a:ext uri="{AF507438-7753-43E0-B8FC-AC1667EBCBE1}">
-              <a14:hiddenEffects xmlns:a14="http://schemas.microsoft.com/office/drawing/2010/main">
+              <a14:hiddenEffects xmlns:a14="http://schemas.microsoft.com/office/drawing/2010/main" xmlns="">
                 <a:effectLst>
                   <a:outerShdw dist="35921" dir="2700000" algn="ctr" rotWithShape="0">
                     <a:schemeClr val="bg2"/>
@@ -14472,8 +14559,8 @@
           </a:p>
         </p:txBody>
       </p:sp>
-      <mc:AlternateContent xmlns:mc="http://schemas.openxmlformats.org/markup-compatibility/2006" xmlns:a14="http://schemas.microsoft.com/office/drawing/2010/main">
-        <mc:Choice Requires="a14">
+      <mc:AlternateContent xmlns:mc="http://schemas.openxmlformats.org/markup-compatibility/2006">
+        <mc:Choice xmlns:a14="http://schemas.microsoft.com/office/drawing/2010/main" xmlns="" Requires="a14">
           <p:sp>
             <p:nvSpPr>
               <p:cNvPr id="8" name="Содержимое 1"/>
@@ -14910,7 +14997,7 @@
             </p:txBody>
           </p:sp>
         </mc:Choice>
-        <mc:Fallback xmlns="">
+        <mc:Fallback>
           <p:sp>
             <p:nvSpPr>
               <p:cNvPr id="8" name="Содержимое 1"/>
@@ -14928,7 +15015,7 @@
                 <a:avLst/>
               </a:prstGeom>
               <a:blipFill rotWithShape="0">
-                <a:blip r:embed="rId2"/>
+                <a:blip r:embed="rId2" cstate="print"/>
                 <a:stretch>
                   <a:fillRect l="-3295" t="-2683"/>
                 </a:stretch>
@@ -14952,7 +15039,7 @@
     </p:spTree>
     <p:extLst>
       <p:ext uri="{BB962C8B-B14F-4D97-AF65-F5344CB8AC3E}">
-        <p14:creationId xmlns:p14="http://schemas.microsoft.com/office/powerpoint/2010/main" val="611271091"/>
+        <p14:creationId xmlns:p14="http://schemas.microsoft.com/office/powerpoint/2010/main" xmlns="" val="611271091"/>
       </p:ext>
     </p:extLst>
   </p:cSld>
@@ -15077,7 +15164,7 @@
           <a:effectLst/>
           <a:extLst>
             <a:ext uri="{91240B29-F687-4F45-9708-019B960494DF}">
-              <a14:hiddenLine xmlns:a14="http://schemas.microsoft.com/office/drawing/2010/main" w="9525">
+              <a14:hiddenLine xmlns:a14="http://schemas.microsoft.com/office/drawing/2010/main" xmlns="" w="9525">
                 <a:solidFill>
                   <a:schemeClr val="tx1"/>
                 </a:solidFill>
@@ -15087,7 +15174,7 @@
               </a14:hiddenLine>
             </a:ext>
             <a:ext uri="{AF507438-7753-43E0-B8FC-AC1667EBCBE1}">
-              <a14:hiddenEffects xmlns:a14="http://schemas.microsoft.com/office/drawing/2010/main">
+              <a14:hiddenEffects xmlns:a14="http://schemas.microsoft.com/office/drawing/2010/main" xmlns="">
                 <a:effectLst>
                   <a:outerShdw dist="35921" dir="2700000" algn="ctr" rotWithShape="0">
                     <a:schemeClr val="bg2"/>
@@ -17006,8 +17093,8 @@
           </a:p>
         </p:txBody>
       </p:sp>
-      <mc:AlternateContent xmlns:mc="http://schemas.openxmlformats.org/markup-compatibility/2006" xmlns:a14="http://schemas.microsoft.com/office/drawing/2010/main">
-        <mc:Choice Requires="a14">
+      <mc:AlternateContent xmlns:mc="http://schemas.openxmlformats.org/markup-compatibility/2006">
+        <mc:Choice xmlns:a14="http://schemas.microsoft.com/office/drawing/2010/main" xmlns="" Requires="a14">
           <p:sp>
             <p:nvSpPr>
               <p:cNvPr id="6" name="Содержимое 1"/>
@@ -17444,7 +17531,7 @@
             </p:txBody>
           </p:sp>
         </mc:Choice>
-        <mc:Fallback xmlns="">
+        <mc:Fallback>
           <p:sp>
             <p:nvSpPr>
               <p:cNvPr id="6" name="Содержимое 1"/>
@@ -17462,7 +17549,7 @@
                 <a:avLst/>
               </a:prstGeom>
               <a:blipFill rotWithShape="0">
-                <a:blip r:embed="rId2"/>
+                <a:blip r:embed="rId2" cstate="print"/>
                 <a:stretch>
                   <a:fillRect l="-3295" t="-2683"/>
                 </a:stretch>
@@ -17486,7 +17573,7 @@
     </p:spTree>
     <p:extLst>
       <p:ext uri="{BB962C8B-B14F-4D97-AF65-F5344CB8AC3E}">
-        <p14:creationId xmlns:p14="http://schemas.microsoft.com/office/powerpoint/2010/main" val="476216845"/>
+        <p14:creationId xmlns:p14="http://schemas.microsoft.com/office/powerpoint/2010/main" xmlns="" val="476216845"/>
       </p:ext>
     </p:extLst>
   </p:cSld>
@@ -19483,8 +19570,8 @@
           </a:p>
         </p:txBody>
       </p:sp>
-      <mc:AlternateContent xmlns:mc="http://schemas.openxmlformats.org/markup-compatibility/2006" xmlns:a14="http://schemas.microsoft.com/office/drawing/2010/main">
-        <mc:Choice Requires="a14">
+      <mc:AlternateContent xmlns:mc="http://schemas.openxmlformats.org/markup-compatibility/2006">
+        <mc:Choice xmlns:a14="http://schemas.microsoft.com/office/drawing/2010/main" xmlns="" Requires="a14">
           <p:sp>
             <p:nvSpPr>
               <p:cNvPr id="8" name="Содержимое 1"/>
@@ -19934,7 +20021,7 @@
             </p:txBody>
           </p:sp>
         </mc:Choice>
-        <mc:Fallback xmlns="">
+        <mc:Fallback>
           <p:sp>
             <p:nvSpPr>
               <p:cNvPr id="8" name="Содержимое 1"/>
@@ -19954,7 +20041,7 @@
                 <a:avLst/>
               </a:prstGeom>
               <a:blipFill rotWithShape="0">
-                <a:blip r:embed="rId2"/>
+                <a:blip r:embed="rId2" cstate="print"/>
                 <a:stretch>
                   <a:fillRect l="-3287" t="-2683"/>
                 </a:stretch>
@@ -19978,7 +20065,7 @@
     </p:spTree>
     <p:extLst>
       <p:ext uri="{BB962C8B-B14F-4D97-AF65-F5344CB8AC3E}">
-        <p14:creationId xmlns:p14="http://schemas.microsoft.com/office/powerpoint/2010/main" val="3690992376"/>
+        <p14:creationId xmlns:p14="http://schemas.microsoft.com/office/powerpoint/2010/main" xmlns="" val="3690992376"/>
       </p:ext>
     </p:extLst>
   </p:cSld>
@@ -22015,7 +22102,7 @@
     </p:spTree>
     <p:extLst>
       <p:ext uri="{BB962C8B-B14F-4D97-AF65-F5344CB8AC3E}">
-        <p14:creationId xmlns:p14="http://schemas.microsoft.com/office/powerpoint/2010/main" val="2808821390"/>
+        <p14:creationId xmlns:p14="http://schemas.microsoft.com/office/powerpoint/2010/main" xmlns="" val="2808821390"/>
       </p:ext>
     </p:extLst>
   </p:cSld>
@@ -22307,7 +22394,7 @@
   <a:extraClrSchemeLst/>
   <a:extLst>
     <a:ext uri="{05A4C25C-085E-4340-85A3-A5531E510DB2}">
-      <thm15:themeFamily xmlns:thm15="http://schemas.microsoft.com/office/thememl/2012/main" name="Office Theme" id="{62F939B6-93AF-4DB8-9C6B-D6C7DFDC589F}" vid="{4A3C46E8-61CC-4603-A589-7422A47A8E4A}"/>
+      <thm15:themeFamily xmlns:thm15="http://schemas.microsoft.com/office/thememl/2012/main" xmlns="" name="Office Theme" id="{62F939B6-93AF-4DB8-9C6B-D6C7DFDC589F}" vid="{4A3C46E8-61CC-4603-A589-7422A47A8E4A}"/>
     </a:ext>
   </a:extLst>
 </a:theme>
@@ -22568,7 +22655,7 @@
   <a:extraClrSchemeLst/>
   <a:extLst>
     <a:ext uri="{05A4C25C-085E-4340-85A3-A5531E510DB2}">
-      <thm15:themeFamily xmlns:thm15="http://schemas.microsoft.com/office/thememl/2012/main" name="Office Theme" id="{62F939B6-93AF-4DB8-9C6B-D6C7DFDC589F}" vid="{4A3C46E8-61CC-4603-A589-7422A47A8E4A}"/>
+      <thm15:themeFamily xmlns:thm15="http://schemas.microsoft.com/office/thememl/2012/main" xmlns="" name="Office Theme" id="{62F939B6-93AF-4DB8-9C6B-D6C7DFDC589F}" vid="{4A3C46E8-61CC-4603-A589-7422A47A8E4A}"/>
     </a:ext>
   </a:extLst>
 </a:theme>
@@ -22829,7 +22916,7 @@
   <a:extraClrSchemeLst/>
   <a:extLst>
     <a:ext uri="{05A4C25C-085E-4340-85A3-A5531E510DB2}">
-      <thm15:themeFamily xmlns:thm15="http://schemas.microsoft.com/office/thememl/2012/main" name="Office Theme" id="{62F939B6-93AF-4DB8-9C6B-D6C7DFDC589F}" vid="{4A3C46E8-61CC-4603-A589-7422A47A8E4A}"/>
+      <thm15:themeFamily xmlns:thm15="http://schemas.microsoft.com/office/thememl/2012/main" xmlns="" name="Office Theme" id="{62F939B6-93AF-4DB8-9C6B-D6C7DFDC589F}" vid="{4A3C46E8-61CC-4603-A589-7422A47A8E4A}"/>
     </a:ext>
   </a:extLst>
 </a:theme>

</xml_diff>